<commit_message>
Update session 23 documents (again).
</commit_message>
<xml_diff>
--- a/CPSC-24700/Presentations/session-23.pptx
+++ b/CPSC-24700/Presentations/session-23.pptx
@@ -119,6 +119,10 @@
     </p:ext>
   </p:extLst>
 </p:presentation>
+</file>
+
+<file path=ppt/revisionInfo.xml><?xml version="1.0" encoding="utf-8"?>
+<p1510:revInfo xmlns:a="http://schemas.openxmlformats.org/drawingml/2006/main" xmlns:r="http://schemas.openxmlformats.org/officeDocument/2006/relationships" xmlns:p1510="http://schemas.microsoft.com/office/powerpoint/2015/10/main"/>
 </file>
 
 <file path=ppt/notesMasters/notesMaster1.xml><?xml version="1.0" encoding="utf-8"?>
@@ -4409,7 +4413,7 @@
             </a:pPr>
             <a:r>
               <a:rPr lang="en-US" sz="2000" dirty="0"/>
-              <a:t>XML</a:t>
+              <a:t>XML &amp; Web Services</a:t>
             </a:r>
           </a:p>
           <a:p>

</xml_diff>